<commit_message>
added the method to get notes of a given slide from ppt
</commit_message>
<xml_diff>
--- a/spec/data/dest_template.pptx
+++ b/spec/data/dest_template.pptx
@@ -1088,6 +1088,100 @@
             <p:ph type="body" idx="1"/>
           </p:nvPr>
         </p:nvSpPr>
+        <p:spPr/>
+        <p:txBody>
+          <a:bodyPr/>
+          <a:lstStyle/>
+          <a:p>
+            <a:r>
+              <a:rPr lang="en-US" dirty="0" smtClean="0"/>
+              <a:t>NOTE1</a:t>
+            </a:r>
+            <a:endParaRPr lang="en-US" dirty="0"/>
+          </a:p>
+        </p:txBody>
+      </p:sp>
+      <p:sp>
+        <p:nvSpPr>
+          <p:cNvPr id="4" name="Slide Number Placeholder 3"/>
+          <p:cNvSpPr>
+            <a:spLocks noGrp="1"/>
+          </p:cNvSpPr>
+          <p:nvPr>
+            <p:ph type="sldNum" sz="quarter" idx="10"/>
+          </p:nvPr>
+        </p:nvSpPr>
+        <p:spPr/>
+        <p:txBody>
+          <a:bodyPr/>
+          <a:lstStyle/>
+          <a:p>
+            <a:pPr>
+              <a:defRPr/>
+            </a:pPr>
+            <a:fld id="{3C3A632B-FBDE-46D4-BF6F-6D14421E6342}" type="slidenum">
+              <a:rPr lang="en-US" smtClean="0"/>
+              <a:pPr>
+                <a:defRPr/>
+              </a:pPr>
+              <a:t>2</a:t>
+            </a:fld>
+            <a:endParaRPr lang="en-US" dirty="0"/>
+          </a:p>
+        </p:txBody>
+      </p:sp>
+    </p:spTree>
+    <p:extLst>
+      <p:ext uri="{BB962C8B-B14F-4D97-AF65-F5344CB8AC3E}">
+        <p14:creationId xmlns:p14="http://schemas.microsoft.com/office/powerpoint/2010/main" val="665932356"/>
+      </p:ext>
+    </p:extLst>
+  </p:cSld>
+  <p:clrMapOvr>
+    <a:masterClrMapping/>
+  </p:clrMapOvr>
+</p:notes>
+</file>
+
+<file path=ppt/notesSlides/notesSlide4.xml><?xml version="1.0" encoding="utf-8"?>
+<p:notes xmlns:a="http://schemas.openxmlformats.org/drawingml/2006/main" xmlns:r="http://schemas.openxmlformats.org/officeDocument/2006/relationships" xmlns:p="http://schemas.openxmlformats.org/presentationml/2006/main">
+  <p:cSld>
+    <p:spTree>
+      <p:nvGrpSpPr>
+        <p:cNvPr id="1" name=""/>
+        <p:cNvGrpSpPr/>
+        <p:nvPr/>
+      </p:nvGrpSpPr>
+      <p:grpSpPr>
+        <a:xfrm>
+          <a:off x="0" y="0"/>
+          <a:ext cx="0" cy="0"/>
+          <a:chOff x="0" y="0"/>
+          <a:chExt cx="0" cy="0"/>
+        </a:xfrm>
+      </p:grpSpPr>
+      <p:sp>
+        <p:nvSpPr>
+          <p:cNvPr id="2" name="Slide Image Placeholder 1"/>
+          <p:cNvSpPr>
+            <a:spLocks noGrp="1" noRot="1" noChangeAspect="1"/>
+          </p:cNvSpPr>
+          <p:nvPr>
+            <p:ph type="sldImg"/>
+          </p:nvPr>
+        </p:nvSpPr>
+        <p:spPr/>
+      </p:sp>
+      <p:sp>
+        <p:nvSpPr>
+          <p:cNvPr id="3" name="Notes Placeholder 2"/>
+          <p:cNvSpPr>
+            <a:spLocks noGrp="1"/>
+          </p:cNvSpPr>
+          <p:nvPr>
+            <p:ph type="body" idx="1"/>
+          </p:nvPr>
+        </p:nvSpPr>
         <p:spPr>
           <a:xfrm>
             <a:off x="546100" y="5322888"/>
@@ -1144,7 +1238,7 @@
 </p:notes>
 </file>
 
-<file path=ppt/notesSlides/notesSlide4.xml><?xml version="1.0" encoding="utf-8"?>
+<file path=ppt/notesSlides/notesSlide5.xml><?xml version="1.0" encoding="utf-8"?>
 <p:notes xmlns:a="http://schemas.openxmlformats.org/drawingml/2006/main" xmlns:r="http://schemas.openxmlformats.org/officeDocument/2006/relationships" xmlns:p="http://schemas.openxmlformats.org/presentationml/2006/main">
   <p:cSld>
     <p:spTree>
@@ -1239,7 +1333,119 @@
 </p:notes>
 </file>
 
-<file path=ppt/notesSlides/notesSlide5.xml><?xml version="1.0" encoding="utf-8"?>
+<file path=ppt/notesSlides/notesSlide6.xml><?xml version="1.0" encoding="utf-8"?>
+<p:notes xmlns:a="http://schemas.openxmlformats.org/drawingml/2006/main" xmlns:r="http://schemas.openxmlformats.org/officeDocument/2006/relationships" xmlns:p="http://schemas.openxmlformats.org/presentationml/2006/main">
+  <p:cSld>
+    <p:spTree>
+      <p:nvGrpSpPr>
+        <p:cNvPr id="1" name=""/>
+        <p:cNvGrpSpPr/>
+        <p:nvPr/>
+      </p:nvGrpSpPr>
+      <p:grpSpPr>
+        <a:xfrm>
+          <a:off x="0" y="0"/>
+          <a:ext cx="0" cy="0"/>
+          <a:chOff x="0" y="0"/>
+          <a:chExt cx="0" cy="0"/>
+        </a:xfrm>
+      </p:grpSpPr>
+      <p:sp>
+        <p:nvSpPr>
+          <p:cNvPr id="2" name="Slide Image Placeholder 1"/>
+          <p:cNvSpPr>
+            <a:spLocks noGrp="1" noRot="1" noChangeAspect="1"/>
+          </p:cNvSpPr>
+          <p:nvPr>
+            <p:ph type="sldImg"/>
+          </p:nvPr>
+        </p:nvSpPr>
+        <p:spPr/>
+      </p:sp>
+      <p:sp>
+        <p:nvSpPr>
+          <p:cNvPr id="3" name="Notes Placeholder 2"/>
+          <p:cNvSpPr>
+            <a:spLocks noGrp="1"/>
+          </p:cNvSpPr>
+          <p:nvPr>
+            <p:ph type="body" idx="1"/>
+          </p:nvPr>
+        </p:nvSpPr>
+        <p:spPr/>
+        <p:txBody>
+          <a:bodyPr/>
+          <a:lstStyle/>
+          <a:p>
+            <a:pPr marL="0" marR="0" indent="0" algn="l" defTabSz="895350" rtl="0" eaLnBrk="0" fontAlgn="base" latinLnBrk="0" hangingPunct="0">
+              <a:lnSpc>
+                <a:spcPct val="100000"/>
+              </a:lnSpc>
+              <a:spcBef>
+                <a:spcPct val="0"/>
+              </a:spcBef>
+              <a:spcAft>
+                <a:spcPct val="0"/>
+              </a:spcAft>
+              <a:buClr>
+                <a:schemeClr val="tx2"/>
+              </a:buClr>
+              <a:buSzTx/>
+              <a:buFontTx/>
+              <a:buNone/>
+              <a:tabLst/>
+              <a:defRPr/>
+            </a:pPr>
+            <a:r>
+              <a:rPr lang="en-US" dirty="0" smtClean="0"/>
+              <a:t>NOTE2</a:t>
+            </a:r>
+          </a:p>
+        </p:txBody>
+      </p:sp>
+      <p:sp>
+        <p:nvSpPr>
+          <p:cNvPr id="4" name="Slide Number Placeholder 3"/>
+          <p:cNvSpPr>
+            <a:spLocks noGrp="1"/>
+          </p:cNvSpPr>
+          <p:nvPr>
+            <p:ph type="sldNum" sz="quarter" idx="10"/>
+          </p:nvPr>
+        </p:nvSpPr>
+        <p:spPr/>
+        <p:txBody>
+          <a:bodyPr/>
+          <a:lstStyle/>
+          <a:p>
+            <a:pPr>
+              <a:defRPr/>
+            </a:pPr>
+            <a:fld id="{3C3A632B-FBDE-46D4-BF6F-6D14421E6342}" type="slidenum">
+              <a:rPr lang="en-US" smtClean="0"/>
+              <a:pPr>
+                <a:defRPr/>
+              </a:pPr>
+              <a:t>5</a:t>
+            </a:fld>
+            <a:endParaRPr lang="en-US" dirty="0"/>
+          </a:p>
+        </p:txBody>
+      </p:sp>
+    </p:spTree>
+    <p:extLst>
+      <p:ext uri="{BB962C8B-B14F-4D97-AF65-F5344CB8AC3E}">
+        <p14:creationId xmlns:p14="http://schemas.microsoft.com/office/powerpoint/2010/main" val="1304509386"/>
+      </p:ext>
+    </p:extLst>
+  </p:cSld>
+  <p:clrMapOvr>
+    <a:masterClrMapping/>
+  </p:clrMapOvr>
+</p:notes>
+</file>
+
+<file path=ppt/notesSlides/notesSlide7.xml><?xml version="1.0" encoding="utf-8"?>
 <p:notes xmlns:a="http://schemas.openxmlformats.org/drawingml/2006/main" xmlns:r="http://schemas.openxmlformats.org/officeDocument/2006/relationships" xmlns:p="http://schemas.openxmlformats.org/presentationml/2006/main">
   <p:cSld>
     <p:spTree>
@@ -3049,7 +3255,7 @@
           <a:graphicData uri="http://schemas.openxmlformats.org/presentationml/2006/ole">
             <mc:AlternateContent xmlns:mc="http://schemas.openxmlformats.org/markup-compatibility/2006">
               <mc:Choice xmlns:v="urn:schemas-microsoft-com:vml" Requires="v">
-                <p:oleObj spid="_x0000_s12334" name="think-cell Slide" r:id="rId8" imgW="270" imgH="270" progId="TCLayout.ActiveDocument.1">
+                <p:oleObj spid="_x0000_s12340" name="think-cell Slide" r:id="rId8" imgW="270" imgH="270" progId="TCLayout.ActiveDocument.1">
                   <p:embed/>
                 </p:oleObj>
               </mc:Choice>
@@ -5595,7 +5801,7 @@
           <a:graphicData uri="http://schemas.openxmlformats.org/presentationml/2006/ole">
             <mc:AlternateContent xmlns:mc="http://schemas.openxmlformats.org/markup-compatibility/2006">
               <mc:Choice xmlns:v="urn:schemas-microsoft-com:vml" Requires="v">
-                <p:oleObj spid="_x0000_s13349" name="think-cell Slide" r:id="rId5" imgW="270" imgH="270" progId="TCLayout.ActiveDocument.1">
+                <p:oleObj spid="_x0000_s13355" name="think-cell Slide" r:id="rId5" imgW="270" imgH="270" progId="TCLayout.ActiveDocument.1">
                   <p:embed/>
                 </p:oleObj>
               </mc:Choice>
@@ -5975,7 +6181,6 @@
               <a:rPr lang="en-US" dirty="0" smtClean="0"/>
               <a:t> – Slide2</a:t>
             </a:r>
-            <a:endParaRPr lang="en-US" dirty="0" smtClean="0"/>
           </a:p>
         </p:txBody>
       </p:sp>
@@ -6145,7 +6350,7 @@
           <a:graphicData uri="http://schemas.openxmlformats.org/presentationml/2006/ole">
             <mc:AlternateContent xmlns:mc="http://schemas.openxmlformats.org/markup-compatibility/2006">
               <mc:Choice xmlns:v="urn:schemas-microsoft-com:vml" Requires="v">
-                <p:oleObj spid="_x0000_s14366" name="think-cell Slide" r:id="rId12" imgW="500" imgH="417" progId="TCLayout.ActiveDocument.1">
+                <p:oleObj spid="_x0000_s14372" name="think-cell Slide" r:id="rId12" imgW="500" imgH="417" progId="TCLayout.ActiveDocument.1">
                   <p:embed/>
                 </p:oleObj>
               </mc:Choice>
@@ -8019,7 +8224,7 @@
           <a:graphicData uri="http://schemas.openxmlformats.org/presentationml/2006/ole">
             <mc:AlternateContent xmlns:mc="http://schemas.openxmlformats.org/markup-compatibility/2006">
               <mc:Choice xmlns:v="urn:schemas-microsoft-com:vml" Requires="v">
-                <p:oleObj spid="_x0000_s15390" name="think-cell Slide" r:id="rId12" imgW="500" imgH="417" progId="TCLayout.ActiveDocument.1">
+                <p:oleObj spid="_x0000_s15396" name="think-cell Slide" r:id="rId12" imgW="500" imgH="417" progId="TCLayout.ActiveDocument.1">
                   <p:embed/>
                 </p:oleObj>
               </mc:Choice>
@@ -10006,7 +10211,7 @@
           <a:graphicData uri="http://schemas.openxmlformats.org/presentationml/2006/ole">
             <mc:AlternateContent xmlns:mc="http://schemas.openxmlformats.org/markup-compatibility/2006">
               <mc:Choice xmlns:v="urn:schemas-microsoft-com:vml" Requires="v">
-                <p:oleObj spid="_x0000_s16400" name="think-cell Slide" r:id="rId12" imgW="500" imgH="417" progId="TCLayout.ActiveDocument.1">
+                <p:oleObj spid="_x0000_s16406" name="think-cell Slide" r:id="rId12" imgW="500" imgH="417" progId="TCLayout.ActiveDocument.1">
                   <p:embed/>
                 </p:oleObj>
               </mc:Choice>

</xml_diff>